<commit_message>
Update My First Issue Tree Kenney Kwan.pptx
</commit_message>
<xml_diff>
--- a/Issue Trees/My First Issue Tree Kenney Kwan.pptx
+++ b/Issue Trees/My First Issue Tree Kenney Kwan.pptx
@@ -258,11 +258,299 @@
     </a:lvl9pPr>
   </p:defaultTextStyle>
   <p:extLst>
+    <p:ext uri="{EFAFB233-063F-42B5-8137-9DF3F51BA10A}">
+      <p15:sldGuideLst xmlns:p15="http://schemas.microsoft.com/office/powerpoint/2012/main"/>
+    </p:ext>
     <p:ext uri="http://customooxmlschemas.google.com/">
-      <go:slidesCustomData xmlns:go="http://customooxmlschemas.google.com/" xmlns:p15="http://schemas.microsoft.com/office/powerpoint/2012/main" xmlns:p14="http://schemas.microsoft.com/office/powerpoint/2010/main" xmlns:com="http://schemas.openxmlformats.org/drawingml/2006/compatibility" xmlns:pvml="urn:schemas-microsoft-com:office:powerpoint" xmlns:v="urn:schemas-microsoft-com:vml" xmlns:o="urn:schemas-microsoft-com:office:office" xmlns:dgm="http://schemas.openxmlformats.org/drawingml/2006/diagram" xmlns:c="http://schemas.openxmlformats.org/drawingml/2006/chart" xmlns:mv="urn:schemas-microsoft-com:mac:vml" xmlns:mc="http://schemas.openxmlformats.org/markup-compatibility/2006" xmlns="" r:id="rId12" roundtripDataSignature="AMtx7mh25xktGHMJRxX7Qy0FN+pmM3PERQ=="/>
+      <go:slidesCustomData xmlns="" xmlns:mc="http://schemas.openxmlformats.org/markup-compatibility/2006" xmlns:mv="urn:schemas-microsoft-com:mac:vml" xmlns:c="http://schemas.openxmlformats.org/drawingml/2006/chart" xmlns:dgm="http://schemas.openxmlformats.org/drawingml/2006/diagram" xmlns:o="urn:schemas-microsoft-com:office:office" xmlns:v="urn:schemas-microsoft-com:vml" xmlns:pvml="urn:schemas-microsoft-com:office:powerpoint" xmlns:com="http://schemas.openxmlformats.org/drawingml/2006/compatibility" xmlns:p14="http://schemas.microsoft.com/office/powerpoint/2010/main" xmlns:p15="http://schemas.microsoft.com/office/powerpoint/2012/main" xmlns:go="http://customooxmlschemas.google.com/" r:id="rId12" roundtripDataSignature="AMtx7mh25xktGHMJRxX7Qy0FN+pmM3PERQ=="/>
     </p:ext>
   </p:extLst>
 </p:presentation>
+</file>
+
+<file path=ppt/revisionInfo.xml><?xml version="1.0" encoding="utf-8"?>
+<p1510:revInfo xmlns:a="http://schemas.openxmlformats.org/drawingml/2006/main" xmlns:r="http://schemas.openxmlformats.org/officeDocument/2006/relationships" xmlns:p1510="http://schemas.microsoft.com/office/powerpoint/2015/10/main">
+  <p1510:revLst>
+    <p1510:client id="{415DE915-BDFE-46BB-8AE8-7DA0BAAF803F}" v="4" dt="2021-09-08T09:11:27.167"/>
+  </p1510:revLst>
+</p1510:revInfo>
+</file>
+
+<file path=ppt/changesInfos/changesInfo1.xml><?xml version="1.0" encoding="utf-8"?>
+<pc:chgInfo xmlns:a="http://schemas.openxmlformats.org/drawingml/2006/main" xmlns:r="http://schemas.openxmlformats.org/officeDocument/2006/relationships" xmlns:ac="http://schemas.microsoft.com/office/drawing/2013/main/command" xmlns:pc="http://schemas.microsoft.com/office/powerpoint/2013/main/command">
+  <pc:docChgLst>
+    <pc:chgData name="Kenney Kwan" userId="7e8312c5ae1ba077" providerId="LiveId" clId="{415DE915-BDFE-46BB-8AE8-7DA0BAAF803F}"/>
+    <pc:docChg chg="undo redo custSel modSld">
+      <pc:chgData name="Kenney Kwan" userId="7e8312c5ae1ba077" providerId="LiveId" clId="{415DE915-BDFE-46BB-8AE8-7DA0BAAF803F}" dt="2021-09-08T09:53:20.168" v="667" actId="478"/>
+      <pc:docMkLst>
+        <pc:docMk/>
+      </pc:docMkLst>
+      <pc:sldChg chg="addSp delSp modSp mod">
+        <pc:chgData name="Kenney Kwan" userId="7e8312c5ae1ba077" providerId="LiveId" clId="{415DE915-BDFE-46BB-8AE8-7DA0BAAF803F}" dt="2021-09-08T09:53:20.168" v="667" actId="478"/>
+        <pc:sldMkLst>
+          <pc:docMk/>
+          <pc:sldMk cId="0" sldId="256"/>
+        </pc:sldMkLst>
+        <pc:spChg chg="mod">
+          <ac:chgData name="Kenney Kwan" userId="7e8312c5ae1ba077" providerId="LiveId" clId="{415DE915-BDFE-46BB-8AE8-7DA0BAAF803F}" dt="2021-09-08T08:57:17.731" v="189" actId="1076"/>
+          <ac:spMkLst>
+            <pc:docMk/>
+            <pc:sldMk cId="0" sldId="256"/>
+            <ac:spMk id="20" creationId="{00000000-0000-0000-0000-000000000000}"/>
+          </ac:spMkLst>
+        </pc:spChg>
+        <pc:spChg chg="mod">
+          <ac:chgData name="Kenney Kwan" userId="7e8312c5ae1ba077" providerId="LiveId" clId="{415DE915-BDFE-46BB-8AE8-7DA0BAAF803F}" dt="2021-09-08T08:46:40.758" v="16" actId="255"/>
+          <ac:spMkLst>
+            <pc:docMk/>
+            <pc:sldMk cId="0" sldId="256"/>
+            <ac:spMk id="21" creationId="{00000000-0000-0000-0000-000000000000}"/>
+          </ac:spMkLst>
+        </pc:spChg>
+        <pc:spChg chg="mod">
+          <ac:chgData name="Kenney Kwan" userId="7e8312c5ae1ba077" providerId="LiveId" clId="{415DE915-BDFE-46BB-8AE8-7DA0BAAF803F}" dt="2021-09-08T08:48:47.334" v="45" actId="255"/>
+          <ac:spMkLst>
+            <pc:docMk/>
+            <pc:sldMk cId="0" sldId="256"/>
+            <ac:spMk id="22" creationId="{00000000-0000-0000-0000-000000000000}"/>
+          </ac:spMkLst>
+        </pc:spChg>
+        <pc:spChg chg="mod">
+          <ac:chgData name="Kenney Kwan" userId="7e8312c5ae1ba077" providerId="LiveId" clId="{415DE915-BDFE-46BB-8AE8-7DA0BAAF803F}" dt="2021-09-08T08:54:58.398" v="128" actId="14100"/>
+          <ac:spMkLst>
+            <pc:docMk/>
+            <pc:sldMk cId="0" sldId="256"/>
+            <ac:spMk id="23" creationId="{00000000-0000-0000-0000-000000000000}"/>
+          </ac:spMkLst>
+        </pc:spChg>
+        <pc:spChg chg="mod">
+          <ac:chgData name="Kenney Kwan" userId="7e8312c5ae1ba077" providerId="LiveId" clId="{415DE915-BDFE-46BB-8AE8-7DA0BAAF803F}" dt="2021-09-08T08:56:22.488" v="170" actId="255"/>
+          <ac:spMkLst>
+            <pc:docMk/>
+            <pc:sldMk cId="0" sldId="256"/>
+            <ac:spMk id="24" creationId="{00000000-0000-0000-0000-000000000000}"/>
+          </ac:spMkLst>
+        </pc:spChg>
+        <pc:spChg chg="mod">
+          <ac:chgData name="Kenney Kwan" userId="7e8312c5ae1ba077" providerId="LiveId" clId="{415DE915-BDFE-46BB-8AE8-7DA0BAAF803F}" dt="2021-09-08T08:58:49.223" v="217" actId="14100"/>
+          <ac:spMkLst>
+            <pc:docMk/>
+            <pc:sldMk cId="0" sldId="256"/>
+            <ac:spMk id="25" creationId="{00000000-0000-0000-0000-000000000000}"/>
+          </ac:spMkLst>
+        </pc:spChg>
+        <pc:spChg chg="del">
+          <ac:chgData name="Kenney Kwan" userId="7e8312c5ae1ba077" providerId="LiveId" clId="{415DE915-BDFE-46BB-8AE8-7DA0BAAF803F}" dt="2021-09-08T08:57:23.422" v="191" actId="478"/>
+          <ac:spMkLst>
+            <pc:docMk/>
+            <pc:sldMk cId="0" sldId="256"/>
+            <ac:spMk id="26" creationId="{00000000-0000-0000-0000-000000000000}"/>
+          </ac:spMkLst>
+        </pc:spChg>
+        <pc:spChg chg="mod">
+          <ac:chgData name="Kenney Kwan" userId="7e8312c5ae1ba077" providerId="LiveId" clId="{415DE915-BDFE-46BB-8AE8-7DA0BAAF803F}" dt="2021-09-08T09:19:44.681" v="478" actId="255"/>
+          <ac:spMkLst>
+            <pc:docMk/>
+            <pc:sldMk cId="0" sldId="256"/>
+            <ac:spMk id="27" creationId="{00000000-0000-0000-0000-000000000000}"/>
+          </ac:spMkLst>
+        </pc:spChg>
+        <pc:spChg chg="mod">
+          <ac:chgData name="Kenney Kwan" userId="7e8312c5ae1ba077" providerId="LiveId" clId="{415DE915-BDFE-46BB-8AE8-7DA0BAAF803F}" dt="2021-09-08T09:00:08.112" v="284" actId="255"/>
+          <ac:spMkLst>
+            <pc:docMk/>
+            <pc:sldMk cId="0" sldId="256"/>
+            <ac:spMk id="28" creationId="{00000000-0000-0000-0000-000000000000}"/>
+          </ac:spMkLst>
+        </pc:spChg>
+        <pc:spChg chg="mod">
+          <ac:chgData name="Kenney Kwan" userId="7e8312c5ae1ba077" providerId="LiveId" clId="{415DE915-BDFE-46BB-8AE8-7DA0BAAF803F}" dt="2021-09-08T09:23:42.796" v="518" actId="255"/>
+          <ac:spMkLst>
+            <pc:docMk/>
+            <pc:sldMk cId="0" sldId="256"/>
+            <ac:spMk id="29" creationId="{00000000-0000-0000-0000-000000000000}"/>
+          </ac:spMkLst>
+        </pc:spChg>
+        <pc:spChg chg="mod">
+          <ac:chgData name="Kenney Kwan" userId="7e8312c5ae1ba077" providerId="LiveId" clId="{415DE915-BDFE-46BB-8AE8-7DA0BAAF803F}" dt="2021-09-08T09:50:09.641" v="578" actId="255"/>
+          <ac:spMkLst>
+            <pc:docMk/>
+            <pc:sldMk cId="0" sldId="256"/>
+            <ac:spMk id="30" creationId="{00000000-0000-0000-0000-000000000000}"/>
+          </ac:spMkLst>
+        </pc:spChg>
+        <pc:spChg chg="mod">
+          <ac:chgData name="Kenney Kwan" userId="7e8312c5ae1ba077" providerId="LiveId" clId="{415DE915-BDFE-46BB-8AE8-7DA0BAAF803F}" dt="2021-09-08T09:50:22.387" v="605" actId="255"/>
+          <ac:spMkLst>
+            <pc:docMk/>
+            <pc:sldMk cId="0" sldId="256"/>
+            <ac:spMk id="31" creationId="{00000000-0000-0000-0000-000000000000}"/>
+          </ac:spMkLst>
+        </pc:spChg>
+        <pc:spChg chg="del mod">
+          <ac:chgData name="Kenney Kwan" userId="7e8312c5ae1ba077" providerId="LiveId" clId="{415DE915-BDFE-46BB-8AE8-7DA0BAAF803F}" dt="2021-09-08T08:57:27.663" v="193" actId="478"/>
+          <ac:spMkLst>
+            <pc:docMk/>
+            <pc:sldMk cId="0" sldId="256"/>
+            <ac:spMk id="32" creationId="{00000000-0000-0000-0000-000000000000}"/>
+          </ac:spMkLst>
+        </pc:spChg>
+        <pc:spChg chg="mod">
+          <ac:chgData name="Kenney Kwan" userId="7e8312c5ae1ba077" providerId="LiveId" clId="{415DE915-BDFE-46BB-8AE8-7DA0BAAF803F}" dt="2021-09-08T09:06:15.965" v="335" actId="255"/>
+          <ac:spMkLst>
+            <pc:docMk/>
+            <pc:sldMk cId="0" sldId="256"/>
+            <ac:spMk id="33" creationId="{00000000-0000-0000-0000-000000000000}"/>
+          </ac:spMkLst>
+        </pc:spChg>
+        <pc:spChg chg="del">
+          <ac:chgData name="Kenney Kwan" userId="7e8312c5ae1ba077" providerId="LiveId" clId="{415DE915-BDFE-46BB-8AE8-7DA0BAAF803F}" dt="2021-09-08T08:57:20.269" v="190" actId="478"/>
+          <ac:spMkLst>
+            <pc:docMk/>
+            <pc:sldMk cId="0" sldId="256"/>
+            <ac:spMk id="34" creationId="{00000000-0000-0000-0000-000000000000}"/>
+          </ac:spMkLst>
+        </pc:spChg>
+        <pc:spChg chg="mod">
+          <ac:chgData name="Kenney Kwan" userId="7e8312c5ae1ba077" providerId="LiveId" clId="{415DE915-BDFE-46BB-8AE8-7DA0BAAF803F}" dt="2021-09-08T08:52:47.326" v="78" actId="20577"/>
+          <ac:spMkLst>
+            <pc:docMk/>
+            <pc:sldMk cId="0" sldId="256"/>
+            <ac:spMk id="48" creationId="{00000000-0000-0000-0000-000000000000}"/>
+          </ac:spMkLst>
+        </pc:spChg>
+        <pc:spChg chg="mod">
+          <ac:chgData name="Kenney Kwan" userId="7e8312c5ae1ba077" providerId="LiveId" clId="{415DE915-BDFE-46BB-8AE8-7DA0BAAF803F}" dt="2021-09-08T09:11:04.018" v="424" actId="1076"/>
+          <ac:spMkLst>
+            <pc:docMk/>
+            <pc:sldMk cId="0" sldId="256"/>
+            <ac:spMk id="66" creationId="{00000000-0000-0000-0000-000000000000}"/>
+          </ac:spMkLst>
+        </pc:spChg>
+        <pc:spChg chg="del mod">
+          <ac:chgData name="Kenney Kwan" userId="7e8312c5ae1ba077" providerId="LiveId" clId="{415DE915-BDFE-46BB-8AE8-7DA0BAAF803F}" dt="2021-09-08T09:10:35.750" v="420" actId="478"/>
+          <ac:spMkLst>
+            <pc:docMk/>
+            <pc:sldMk cId="0" sldId="256"/>
+            <ac:spMk id="67" creationId="{00000000-0000-0000-0000-000000000000}"/>
+          </ac:spMkLst>
+        </pc:spChg>
+        <pc:spChg chg="add mod">
+          <ac:chgData name="Kenney Kwan" userId="7e8312c5ae1ba077" providerId="LiveId" clId="{415DE915-BDFE-46BB-8AE8-7DA0BAAF803F}" dt="2021-09-08T09:51:11.762" v="665" actId="20577"/>
+          <ac:spMkLst>
+            <pc:docMk/>
+            <pc:sldMk cId="0" sldId="256"/>
+            <ac:spMk id="70" creationId="{D0592285-C7D5-461A-9AA3-79D23D47A999}"/>
+          </ac:spMkLst>
+        </pc:spChg>
+        <pc:spChg chg="add del mod">
+          <ac:chgData name="Kenney Kwan" userId="7e8312c5ae1ba077" providerId="LiveId" clId="{415DE915-BDFE-46BB-8AE8-7DA0BAAF803F}" dt="2021-09-08T09:53:17.235" v="666" actId="478"/>
+          <ac:spMkLst>
+            <pc:docMk/>
+            <pc:sldMk cId="0" sldId="256"/>
+            <ac:spMk id="71" creationId="{7BD7705A-1008-4344-861A-E78650939264}"/>
+          </ac:spMkLst>
+        </pc:spChg>
+        <pc:cxnChg chg="mod">
+          <ac:chgData name="Kenney Kwan" userId="7e8312c5ae1ba077" providerId="LiveId" clId="{415DE915-BDFE-46BB-8AE8-7DA0BAAF803F}" dt="2021-09-08T08:55:40.618" v="137" actId="1076"/>
+          <ac:cxnSpMkLst>
+            <pc:docMk/>
+            <pc:sldMk cId="0" sldId="256"/>
+            <ac:cxnSpMk id="36" creationId="{00000000-0000-0000-0000-000000000000}"/>
+          </ac:cxnSpMkLst>
+        </pc:cxnChg>
+        <pc:cxnChg chg="mod">
+          <ac:chgData name="Kenney Kwan" userId="7e8312c5ae1ba077" providerId="LiveId" clId="{415DE915-BDFE-46BB-8AE8-7DA0BAAF803F}" dt="2021-09-08T08:55:44.061" v="138" actId="1076"/>
+          <ac:cxnSpMkLst>
+            <pc:docMk/>
+            <pc:sldMk cId="0" sldId="256"/>
+            <ac:cxnSpMk id="37" creationId="{00000000-0000-0000-0000-000000000000}"/>
+          </ac:cxnSpMkLst>
+        </pc:cxnChg>
+        <pc:cxnChg chg="mod">
+          <ac:chgData name="Kenney Kwan" userId="7e8312c5ae1ba077" providerId="LiveId" clId="{415DE915-BDFE-46BB-8AE8-7DA0BAAF803F}" dt="2021-09-08T08:55:30.835" v="134" actId="1076"/>
+          <ac:cxnSpMkLst>
+            <pc:docMk/>
+            <pc:sldMk cId="0" sldId="256"/>
+            <ac:cxnSpMk id="38" creationId="{00000000-0000-0000-0000-000000000000}"/>
+          </ac:cxnSpMkLst>
+        </pc:cxnChg>
+        <pc:cxnChg chg="mod">
+          <ac:chgData name="Kenney Kwan" userId="7e8312c5ae1ba077" providerId="LiveId" clId="{415DE915-BDFE-46BB-8AE8-7DA0BAAF803F}" dt="2021-09-08T08:55:04.404" v="129" actId="1076"/>
+          <ac:cxnSpMkLst>
+            <pc:docMk/>
+            <pc:sldMk cId="0" sldId="256"/>
+            <ac:cxnSpMk id="39" creationId="{00000000-0000-0000-0000-000000000000}"/>
+          </ac:cxnSpMkLst>
+        </pc:cxnChg>
+        <pc:cxnChg chg="mod">
+          <ac:chgData name="Kenney Kwan" userId="7e8312c5ae1ba077" providerId="LiveId" clId="{415DE915-BDFE-46BB-8AE8-7DA0BAAF803F}" dt="2021-09-08T08:55:17.074" v="132" actId="1076"/>
+          <ac:cxnSpMkLst>
+            <pc:docMk/>
+            <pc:sldMk cId="0" sldId="256"/>
+            <ac:cxnSpMk id="40" creationId="{00000000-0000-0000-0000-000000000000}"/>
+          </ac:cxnSpMkLst>
+        </pc:cxnChg>
+        <pc:cxnChg chg="mod">
+          <ac:chgData name="Kenney Kwan" userId="7e8312c5ae1ba077" providerId="LiveId" clId="{415DE915-BDFE-46BB-8AE8-7DA0BAAF803F}" dt="2021-09-08T08:55:24.965" v="133" actId="1076"/>
+          <ac:cxnSpMkLst>
+            <pc:docMk/>
+            <pc:sldMk cId="0" sldId="256"/>
+            <ac:cxnSpMk id="41" creationId="{00000000-0000-0000-0000-000000000000}"/>
+          </ac:cxnSpMkLst>
+        </pc:cxnChg>
+        <pc:cxnChg chg="del">
+          <ac:chgData name="Kenney Kwan" userId="7e8312c5ae1ba077" providerId="LiveId" clId="{415DE915-BDFE-46BB-8AE8-7DA0BAAF803F}" dt="2021-09-08T08:57:30.620" v="194" actId="478"/>
+          <ac:cxnSpMkLst>
+            <pc:docMk/>
+            <pc:sldMk cId="0" sldId="256"/>
+            <ac:cxnSpMk id="42" creationId="{00000000-0000-0000-0000-000000000000}"/>
+          </ac:cxnSpMkLst>
+        </pc:cxnChg>
+        <pc:cxnChg chg="add del">
+          <ac:chgData name="Kenney Kwan" userId="7e8312c5ae1ba077" providerId="LiveId" clId="{415DE915-BDFE-46BB-8AE8-7DA0BAAF803F}" dt="2021-09-08T08:58:13.172" v="211" actId="478"/>
+          <ac:cxnSpMkLst>
+            <pc:docMk/>
+            <pc:sldMk cId="0" sldId="256"/>
+            <ac:cxnSpMk id="43" creationId="{00000000-0000-0000-0000-000000000000}"/>
+          </ac:cxnSpMkLst>
+        </pc:cxnChg>
+        <pc:cxnChg chg="mod">
+          <ac:chgData name="Kenney Kwan" userId="7e8312c5ae1ba077" providerId="LiveId" clId="{415DE915-BDFE-46BB-8AE8-7DA0BAAF803F}" dt="2021-09-08T08:58:09.626" v="207" actId="14100"/>
+          <ac:cxnSpMkLst>
+            <pc:docMk/>
+            <pc:sldMk cId="0" sldId="256"/>
+            <ac:cxnSpMk id="46" creationId="{00000000-0000-0000-0000-000000000000}"/>
+          </ac:cxnSpMkLst>
+        </pc:cxnChg>
+        <pc:cxnChg chg="del mod">
+          <ac:chgData name="Kenney Kwan" userId="7e8312c5ae1ba077" providerId="LiveId" clId="{415DE915-BDFE-46BB-8AE8-7DA0BAAF803F}" dt="2021-09-08T08:58:27.928" v="215" actId="478"/>
+          <ac:cxnSpMkLst>
+            <pc:docMk/>
+            <pc:sldMk cId="0" sldId="256"/>
+            <ac:cxnSpMk id="47" creationId="{00000000-0000-0000-0000-000000000000}"/>
+          </ac:cxnSpMkLst>
+        </pc:cxnChg>
+        <pc:cxnChg chg="add mod">
+          <ac:chgData name="Kenney Kwan" userId="7e8312c5ae1ba077" providerId="LiveId" clId="{415DE915-BDFE-46BB-8AE8-7DA0BAAF803F}" dt="2021-09-08T09:11:09.395" v="425" actId="1076"/>
+          <ac:cxnSpMkLst>
+            <pc:docMk/>
+            <pc:sldMk cId="0" sldId="256"/>
+            <ac:cxnSpMk id="68" creationId="{5C651090-9F93-47B2-A9DB-837973F14E09}"/>
+          </ac:cxnSpMkLst>
+        </pc:cxnChg>
+        <pc:cxnChg chg="add del mod">
+          <ac:chgData name="Kenney Kwan" userId="7e8312c5ae1ba077" providerId="LiveId" clId="{415DE915-BDFE-46BB-8AE8-7DA0BAAF803F}" dt="2021-09-08T09:53:20.168" v="667" actId="478"/>
+          <ac:cxnSpMkLst>
+            <pc:docMk/>
+            <pc:sldMk cId="0" sldId="256"/>
+            <ac:cxnSpMk id="69" creationId="{0EA87C52-B96D-4FA6-A5F0-B8CF13FF920C}"/>
+          </ac:cxnSpMkLst>
+        </pc:cxnChg>
+      </pc:sldChg>
+    </pc:docChg>
+  </pc:docChgLst>
+</pc:chgInfo>
 </file>
 
 <file path=ppt/notesMasters/notesMaster1.xml><?xml version="1.0" encoding="utf-8"?>
@@ -3156,7 +3444,7 @@
         </p:nvSpPr>
         <p:spPr>
           <a:xfrm>
-            <a:off x="292426" y="1275171"/>
+            <a:off x="183951" y="1275166"/>
             <a:ext cx="8851200" cy="4939500"/>
           </a:xfrm>
           <a:prstGeom prst="rect">
@@ -3198,7 +3486,7 @@
               <a:buFont typeface="Arial"/>
               <a:buNone/>
             </a:pPr>
-            <a:endParaRPr sz="1428" b="0" i="0" u="none" strike="noStrike" cap="none">
+            <a:endParaRPr sz="1428" b="0" i="0" u="none" strike="noStrike" cap="none" dirty="0">
               <a:solidFill>
                 <a:srgbClr val="000000"/>
               </a:solidFill>
@@ -3218,8 +3506,8 @@
         </p:nvSpPr>
         <p:spPr>
           <a:xfrm>
-            <a:off x="471240" y="3650231"/>
-            <a:ext cx="914220" cy="375611"/>
+            <a:off x="359710" y="2009042"/>
+            <a:ext cx="1025750" cy="3181337"/>
           </a:xfrm>
           <a:prstGeom prst="round1Rect">
             <a:avLst>
@@ -3239,28 +3527,50 @@
           </a:bodyPr>
           <a:lstStyle/>
           <a:p>
-            <a:pPr marL="342900" marR="0" lvl="0" indent="-342900" algn="l" rtl="0">
-              <a:spcBef>
-                <a:spcPts val="0"/>
-              </a:spcBef>
-              <a:spcAft>
-                <a:spcPts val="0"/>
-              </a:spcAft>
-              <a:buNone/>
+            <a:pPr marL="0" marR="0">
+              <a:lnSpc>
+                <a:spcPct val="107000"/>
+              </a:lnSpc>
+              <a:spcBef>
+                <a:spcPts val="0"/>
+              </a:spcBef>
+              <a:spcAft>
+                <a:spcPts val="800"/>
+              </a:spcAft>
             </a:pPr>
             <a:r>
-              <a:rPr lang="en-AU" sz="1400" b="1" i="0" u="none" strike="noStrike" cap="none">
-                <a:solidFill>
-                  <a:schemeClr val="lt1"/>
-                </a:solidFill>
-                <a:latin typeface="Arial"/>
-                <a:ea typeface="Arial"/>
-                <a:cs typeface="Arial"/>
-                <a:sym typeface="Arial"/>
+              <a:rPr lang="en-US" sz="1000" b="1" dirty="0">
+                <a:effectLst/>
+                <a:latin typeface="Calibri" panose="020F0502020204030204" pitchFamily="34" charset="0"/>
+                <a:ea typeface="Calibri" panose="020F0502020204030204" pitchFamily="34" charset="0"/>
+                <a:cs typeface="Times New Roman" panose="02020603050405020304" pitchFamily="18" charset="0"/>
               </a:rPr>
-              <a:t>Problem</a:t>
+              <a:t>How can Nordic Sensing reduce </a:t>
             </a:r>
-            <a:endParaRPr/>
+            <a:r>
+              <a:rPr lang="en-US" sz="1000" b="1" dirty="0" err="1">
+                <a:effectLst/>
+                <a:latin typeface="Calibri" panose="020F0502020204030204" pitchFamily="34" charset="0"/>
+                <a:ea typeface="Calibri" panose="020F0502020204030204" pitchFamily="34" charset="0"/>
+                <a:cs typeface="Times New Roman" panose="02020603050405020304" pitchFamily="18" charset="0"/>
+              </a:rPr>
+              <a:t>InSense</a:t>
+            </a:r>
+            <a:r>
+              <a:rPr lang="en-US" sz="1000" b="1" dirty="0">
+                <a:effectLst/>
+                <a:latin typeface="Calibri" panose="020F0502020204030204" pitchFamily="34" charset="0"/>
+                <a:ea typeface="Calibri" panose="020F0502020204030204" pitchFamily="34" charset="0"/>
+                <a:cs typeface="Times New Roman" panose="02020603050405020304" pitchFamily="18" charset="0"/>
+              </a:rPr>
+              <a:t> failure rate to below 5% by the end of the month by identifying if the parts are coming from a specific supplier or if faulty sensors are coming from a specific factory? </a:t>
+            </a:r>
+            <a:endParaRPr lang="en-US" sz="1000" dirty="0">
+              <a:effectLst/>
+              <a:latin typeface="Calibri" panose="020F0502020204030204" pitchFamily="34" charset="0"/>
+              <a:ea typeface="Calibri" panose="020F0502020204030204" pitchFamily="34" charset="0"/>
+              <a:cs typeface="Times New Roman" panose="02020603050405020304" pitchFamily="18" charset="0"/>
+            </a:endParaRPr>
           </a:p>
         </p:txBody>
       </p:sp>
@@ -3303,18 +3613,14 @@
               <a:buNone/>
             </a:pPr>
             <a:r>
-              <a:rPr lang="en-AU" sz="1400" b="1" i="0" u="none" strike="noStrike" cap="none">
+              <a:rPr lang="en-AU" sz="1100" b="1" dirty="0">
                 <a:solidFill>
                   <a:schemeClr val="lt1"/>
                 </a:solidFill>
-                <a:latin typeface="Arial"/>
-                <a:ea typeface="Arial"/>
-                <a:cs typeface="Arial"/>
-                <a:sym typeface="Arial"/>
               </a:rPr>
-              <a:t>Issue 4</a:t>
+              <a:t>Do Nothing</a:t>
             </a:r>
-            <a:endParaRPr/>
+            <a:endParaRPr sz="1100" dirty="0"/>
           </a:p>
         </p:txBody>
       </p:sp>
@@ -3326,8 +3632,8 @@
         </p:nvSpPr>
         <p:spPr>
           <a:xfrm>
-            <a:off x="1619373" y="2009042"/>
-            <a:ext cx="908050" cy="329444"/>
+            <a:off x="1619372" y="1940401"/>
+            <a:ext cx="1257808" cy="437088"/>
           </a:xfrm>
           <a:prstGeom prst="round1Rect">
             <a:avLst>
@@ -3357,7 +3663,7 @@
               <a:buNone/>
             </a:pPr>
             <a:r>
-              <a:rPr lang="en-AU" sz="1400" b="1" i="0" u="none" strike="noStrike" cap="none">
+              <a:rPr lang="en-AU" sz="1000" b="1" i="0" u="none" strike="noStrike" cap="none" dirty="0">
                 <a:solidFill>
                   <a:schemeClr val="lt1"/>
                 </a:solidFill>
@@ -3366,9 +3672,9 @@
                 <a:cs typeface="Arial"/>
                 <a:sym typeface="Arial"/>
               </a:rPr>
-              <a:t>Issue 1</a:t>
+              <a:t>Problem with the Factories</a:t>
             </a:r>
-            <a:endParaRPr/>
+            <a:endParaRPr lang="en-AU" sz="1000" dirty="0"/>
           </a:p>
         </p:txBody>
       </p:sp>
@@ -3380,8 +3686,8 @@
         </p:nvSpPr>
         <p:spPr>
           <a:xfrm>
-            <a:off x="1619373" y="2779623"/>
-            <a:ext cx="908050" cy="390999"/>
+            <a:off x="1635209" y="2750159"/>
+            <a:ext cx="1154754" cy="420462"/>
           </a:xfrm>
           <a:prstGeom prst="round1Rect">
             <a:avLst>
@@ -3411,7 +3717,7 @@
               <a:buNone/>
             </a:pPr>
             <a:r>
-              <a:rPr lang="en-AU" sz="1400" b="1" i="0" u="none" strike="noStrike" cap="none">
+              <a:rPr lang="en-AU" sz="1000" b="1" i="0" u="none" strike="noStrike" cap="none" dirty="0">
                 <a:solidFill>
                   <a:schemeClr val="lt1"/>
                 </a:solidFill>
@@ -3420,9 +3726,9 @@
                 <a:cs typeface="Arial"/>
                 <a:sym typeface="Arial"/>
               </a:rPr>
-              <a:t>Issue 2</a:t>
+              <a:t>Problem with parts suppliers</a:t>
             </a:r>
-            <a:endParaRPr/>
+            <a:endParaRPr sz="1000" dirty="0"/>
           </a:p>
         </p:txBody>
       </p:sp>
@@ -3434,8 +3740,8 @@
         </p:nvSpPr>
         <p:spPr>
           <a:xfrm>
-            <a:off x="1619373" y="3611759"/>
-            <a:ext cx="908050" cy="390999"/>
+            <a:off x="1619372" y="3610515"/>
+            <a:ext cx="1126623" cy="392244"/>
           </a:xfrm>
           <a:prstGeom prst="round1Rect">
             <a:avLst>
@@ -3465,7 +3771,7 @@
               <a:buNone/>
             </a:pPr>
             <a:r>
-              <a:rPr lang="en-AU" sz="1400" b="1" i="0" u="none" strike="noStrike" cap="none">
+              <a:rPr lang="en-AU" sz="900" b="1" i="0" u="none" strike="noStrike" cap="none" dirty="0">
                 <a:solidFill>
                   <a:schemeClr val="lt1"/>
                 </a:solidFill>
@@ -3474,22 +3780,22 @@
                 <a:cs typeface="Arial"/>
                 <a:sym typeface="Arial"/>
               </a:rPr>
-              <a:t>Issue 3</a:t>
+              <a:t>Problem in Testing</a:t>
             </a:r>
-            <a:endParaRPr/>
+            <a:endParaRPr sz="900" dirty="0"/>
           </a:p>
         </p:txBody>
       </p:sp>
       <p:sp>
         <p:nvSpPr>
-          <p:cNvPr id="26" name="Google Shape;26;p1"/>
+          <p:cNvPr id="27" name="Google Shape;27;p1"/>
           <p:cNvSpPr/>
           <p:nvPr/>
         </p:nvSpPr>
         <p:spPr>
           <a:xfrm>
-            <a:off x="1619373" y="5276032"/>
-            <a:ext cx="908050" cy="390999"/>
+            <a:off x="3025692" y="2182880"/>
+            <a:ext cx="1313317" cy="379725"/>
           </a:xfrm>
           <a:prstGeom prst="round1Rect">
             <a:avLst>
@@ -3519,7 +3825,7 @@
               <a:buNone/>
             </a:pPr>
             <a:r>
-              <a:rPr lang="en-AU" sz="1400" b="1" i="0" u="none" strike="noStrike" cap="none">
+              <a:rPr lang="en-AU" sz="800" b="1" i="0" u="none" strike="noStrike" cap="none" dirty="0">
                 <a:solidFill>
                   <a:schemeClr val="lt1"/>
                 </a:solidFill>
@@ -3528,22 +3834,22 @@
                 <a:cs typeface="Arial"/>
                 <a:sym typeface="Arial"/>
               </a:rPr>
-              <a:t>Issue 5</a:t>
+              <a:t>Manufacturing process not causing the error</a:t>
             </a:r>
-            <a:endParaRPr/>
+            <a:endParaRPr sz="800" dirty="0"/>
           </a:p>
         </p:txBody>
       </p:sp>
       <p:sp>
         <p:nvSpPr>
-          <p:cNvPr id="27" name="Google Shape;27;p1"/>
+          <p:cNvPr id="28" name="Google Shape;28;p1"/>
           <p:cNvSpPr/>
           <p:nvPr/>
         </p:nvSpPr>
         <p:spPr>
           <a:xfrm>
-            <a:off x="2752069" y="2186330"/>
-            <a:ext cx="1165631" cy="390999"/>
+            <a:off x="3008127" y="2625692"/>
+            <a:ext cx="1347932" cy="419271"/>
           </a:xfrm>
           <a:prstGeom prst="round1Rect">
             <a:avLst>
@@ -3573,31 +3879,27 @@
               <a:buNone/>
             </a:pPr>
             <a:r>
-              <a:rPr lang="en-AU" sz="1400" b="1" i="0" u="none" strike="noStrike" cap="none">
+              <a:rPr lang="en-AU" sz="800" b="1" dirty="0">
                 <a:solidFill>
                   <a:schemeClr val="lt1"/>
                 </a:solidFill>
-                <a:latin typeface="Arial"/>
-                <a:ea typeface="Arial"/>
-                <a:cs typeface="Arial"/>
-                <a:sym typeface="Arial"/>
               </a:rPr>
-              <a:t>Sub-issue</a:t>
+              <a:t>Parts for the sensor was made incorrectly</a:t>
             </a:r>
-            <a:endParaRPr/>
+            <a:endParaRPr sz="800" b="1" dirty="0"/>
           </a:p>
         </p:txBody>
       </p:sp>
       <p:sp>
         <p:nvSpPr>
-          <p:cNvPr id="28" name="Google Shape;28;p1"/>
+          <p:cNvPr id="29" name="Google Shape;29;p1"/>
           <p:cNvSpPr/>
           <p:nvPr/>
         </p:nvSpPr>
         <p:spPr>
           <a:xfrm>
-            <a:off x="2752069" y="2598062"/>
-            <a:ext cx="1165631" cy="390999"/>
+            <a:off x="2994482" y="3044963"/>
+            <a:ext cx="1361577" cy="390999"/>
           </a:xfrm>
           <a:prstGeom prst="round1Rect">
             <a:avLst>
@@ -3627,7 +3929,7 @@
               <a:buNone/>
             </a:pPr>
             <a:r>
-              <a:rPr lang="en-AU" sz="1400" b="1" i="0" u="none" strike="noStrike" cap="none">
+              <a:rPr lang="en-AU" sz="900" b="1" i="0" u="none" strike="noStrike" cap="none" dirty="0">
                 <a:solidFill>
                   <a:schemeClr val="lt1"/>
                 </a:solidFill>
@@ -3636,22 +3938,22 @@
                 <a:cs typeface="Arial"/>
                 <a:sym typeface="Arial"/>
               </a:rPr>
-              <a:t>Sub-issue</a:t>
+              <a:t>Parts for the sensor was made correctly</a:t>
             </a:r>
-            <a:endParaRPr/>
+            <a:endParaRPr sz="900" dirty="0"/>
           </a:p>
         </p:txBody>
       </p:sp>
       <p:sp>
         <p:nvSpPr>
-          <p:cNvPr id="29" name="Google Shape;29;p1"/>
+          <p:cNvPr id="30" name="Google Shape;30;p1"/>
           <p:cNvSpPr/>
           <p:nvPr/>
         </p:nvSpPr>
         <p:spPr>
           <a:xfrm>
-            <a:off x="2752069" y="3009794"/>
-            <a:ext cx="1165631" cy="390999"/>
+            <a:off x="2984227" y="3484996"/>
+            <a:ext cx="1361577" cy="413731"/>
           </a:xfrm>
           <a:prstGeom prst="round1Rect">
             <a:avLst>
@@ -3681,7 +3983,7 @@
               <a:buNone/>
             </a:pPr>
             <a:r>
-              <a:rPr lang="en-AU" sz="1400" b="1" i="0" u="none" strike="noStrike" cap="none">
+              <a:rPr lang="en-US" sz="1000" b="1" i="0" u="none" strike="noStrike" cap="none" dirty="0">
                 <a:solidFill>
                   <a:schemeClr val="lt1"/>
                 </a:solidFill>
@@ -3690,22 +3992,22 @@
                 <a:cs typeface="Arial"/>
                 <a:sym typeface="Arial"/>
               </a:rPr>
-              <a:t>Sub-issue</a:t>
+              <a:t>Failure rate not actually 15%</a:t>
             </a:r>
-            <a:endParaRPr/>
+            <a:endParaRPr lang="en-US" sz="1000" dirty="0"/>
           </a:p>
         </p:txBody>
       </p:sp>
       <p:sp>
         <p:nvSpPr>
-          <p:cNvPr id="30" name="Google Shape;30;p1"/>
+          <p:cNvPr id="31" name="Google Shape;31;p1"/>
           <p:cNvSpPr/>
           <p:nvPr/>
         </p:nvSpPr>
         <p:spPr>
           <a:xfrm>
-            <a:off x="2752069" y="3421526"/>
-            <a:ext cx="1165631" cy="390999"/>
+            <a:off x="2994481" y="3901705"/>
+            <a:ext cx="1361578" cy="370537"/>
           </a:xfrm>
           <a:prstGeom prst="round1Rect">
             <a:avLst>
@@ -3735,7 +4037,7 @@
               <a:buNone/>
             </a:pPr>
             <a:r>
-              <a:rPr lang="en-AU" sz="1400" b="1" i="0" u="none" strike="noStrike" cap="none">
+              <a:rPr lang="en-AU" sz="1000" b="1" i="0" u="none" strike="noStrike" cap="none" dirty="0">
                 <a:solidFill>
                   <a:schemeClr val="lt1"/>
                 </a:solidFill>
@@ -3744,22 +4046,22 @@
                 <a:cs typeface="Arial"/>
                 <a:sym typeface="Arial"/>
               </a:rPr>
-              <a:t>Sub-issue</a:t>
+              <a:t>Failure rate actually 15%</a:t>
             </a:r>
-            <a:endParaRPr/>
+            <a:endParaRPr sz="1000" dirty="0"/>
           </a:p>
         </p:txBody>
       </p:sp>
       <p:sp>
         <p:nvSpPr>
-          <p:cNvPr id="31" name="Google Shape;31;p1"/>
+          <p:cNvPr id="33" name="Google Shape;33;p1"/>
           <p:cNvSpPr/>
           <p:nvPr/>
         </p:nvSpPr>
         <p:spPr>
           <a:xfrm>
-            <a:off x="2752069" y="3833259"/>
-            <a:ext cx="1165631" cy="390999"/>
+            <a:off x="3033286" y="1742782"/>
+            <a:ext cx="1279315" cy="409051"/>
           </a:xfrm>
           <a:prstGeom prst="round1Rect">
             <a:avLst>
@@ -3789,7 +4091,7 @@
               <a:buNone/>
             </a:pPr>
             <a:r>
-              <a:rPr lang="en-AU" sz="1400" b="1" i="0" u="none" strike="noStrike" cap="none">
+              <a:rPr lang="en-AU" sz="900" b="1" i="0" u="none" strike="noStrike" cap="none" dirty="0">
                 <a:solidFill>
                   <a:schemeClr val="lt1"/>
                 </a:solidFill>
@@ -3798,171 +4100,9 @@
                 <a:cs typeface="Arial"/>
                 <a:sym typeface="Arial"/>
               </a:rPr>
-              <a:t>Sub-issue</a:t>
+              <a:t>Manufacturing process was causing errors</a:t>
             </a:r>
-            <a:endParaRPr/>
-          </a:p>
-        </p:txBody>
-      </p:sp>
-      <p:sp>
-        <p:nvSpPr>
-          <p:cNvPr id="32" name="Google Shape;32;p1"/>
-          <p:cNvSpPr/>
-          <p:nvPr/>
-        </p:nvSpPr>
-        <p:spPr>
-          <a:xfrm>
-            <a:off x="2752069" y="5069922"/>
-            <a:ext cx="1165631" cy="390999"/>
-          </a:xfrm>
-          <a:prstGeom prst="round1Rect">
-            <a:avLst>
-              <a:gd name="adj" fmla="val 16667"/>
-            </a:avLst>
-          </a:prstGeom>
-          <a:solidFill>
-            <a:srgbClr val="00C09D"/>
-          </a:solidFill>
-          <a:ln>
-            <a:noFill/>
-          </a:ln>
-        </p:spPr>
-        <p:txBody>
-          <a:bodyPr spcFirstLastPara="1" wrap="square" lIns="54850" tIns="45700" rIns="45700" bIns="45700" anchor="ctr" anchorCtr="0">
-            <a:noAutofit/>
-          </a:bodyPr>
-          <a:lstStyle/>
-          <a:p>
-            <a:pPr marL="342900" marR="0" lvl="0" indent="-342900" algn="l" rtl="0">
-              <a:spcBef>
-                <a:spcPts val="0"/>
-              </a:spcBef>
-              <a:spcAft>
-                <a:spcPts val="0"/>
-              </a:spcAft>
-              <a:buNone/>
-            </a:pPr>
-            <a:r>
-              <a:rPr lang="en-AU" sz="1400" b="1" i="0" u="none" strike="noStrike" cap="none">
-                <a:solidFill>
-                  <a:schemeClr val="lt1"/>
-                </a:solidFill>
-                <a:latin typeface="Arial"/>
-                <a:ea typeface="Arial"/>
-                <a:cs typeface="Arial"/>
-                <a:sym typeface="Arial"/>
-              </a:rPr>
-              <a:t>Sub-issue</a:t>
-            </a:r>
-            <a:endParaRPr/>
-          </a:p>
-        </p:txBody>
-      </p:sp>
-      <p:sp>
-        <p:nvSpPr>
-          <p:cNvPr id="33" name="Google Shape;33;p1"/>
-          <p:cNvSpPr/>
-          <p:nvPr/>
-        </p:nvSpPr>
-        <p:spPr>
-          <a:xfrm>
-            <a:off x="2752069" y="1774598"/>
-            <a:ext cx="1165631" cy="390999"/>
-          </a:xfrm>
-          <a:prstGeom prst="round1Rect">
-            <a:avLst>
-              <a:gd name="adj" fmla="val 16667"/>
-            </a:avLst>
-          </a:prstGeom>
-          <a:solidFill>
-            <a:srgbClr val="00C09D"/>
-          </a:solidFill>
-          <a:ln>
-            <a:noFill/>
-          </a:ln>
-        </p:spPr>
-        <p:txBody>
-          <a:bodyPr spcFirstLastPara="1" wrap="square" lIns="54850" tIns="45700" rIns="45700" bIns="45700" anchor="ctr" anchorCtr="0">
-            <a:noAutofit/>
-          </a:bodyPr>
-          <a:lstStyle/>
-          <a:p>
-            <a:pPr marL="342900" marR="0" lvl="0" indent="-342900" algn="l" rtl="0">
-              <a:spcBef>
-                <a:spcPts val="0"/>
-              </a:spcBef>
-              <a:spcAft>
-                <a:spcPts val="0"/>
-              </a:spcAft>
-              <a:buNone/>
-            </a:pPr>
-            <a:r>
-              <a:rPr lang="en-AU" sz="1400" b="1" i="0" u="none" strike="noStrike" cap="none">
-                <a:solidFill>
-                  <a:schemeClr val="lt1"/>
-                </a:solidFill>
-                <a:latin typeface="Arial"/>
-                <a:ea typeface="Arial"/>
-                <a:cs typeface="Arial"/>
-                <a:sym typeface="Arial"/>
-              </a:rPr>
-              <a:t>Sub-issue</a:t>
-            </a:r>
-            <a:endParaRPr/>
-          </a:p>
-        </p:txBody>
-      </p:sp>
-      <p:sp>
-        <p:nvSpPr>
-          <p:cNvPr id="34" name="Google Shape;34;p1"/>
-          <p:cNvSpPr/>
-          <p:nvPr/>
-        </p:nvSpPr>
-        <p:spPr>
-          <a:xfrm>
-            <a:off x="2752069" y="5484586"/>
-            <a:ext cx="1165631" cy="390999"/>
-          </a:xfrm>
-          <a:prstGeom prst="round1Rect">
-            <a:avLst>
-              <a:gd name="adj" fmla="val 16667"/>
-            </a:avLst>
-          </a:prstGeom>
-          <a:solidFill>
-            <a:srgbClr val="00C09D"/>
-          </a:solidFill>
-          <a:ln>
-            <a:noFill/>
-          </a:ln>
-        </p:spPr>
-        <p:txBody>
-          <a:bodyPr spcFirstLastPara="1" wrap="square" lIns="54850" tIns="45700" rIns="45700" bIns="45700" anchor="ctr" anchorCtr="0">
-            <a:noAutofit/>
-          </a:bodyPr>
-          <a:lstStyle/>
-          <a:p>
-            <a:pPr marL="342900" marR="0" lvl="0" indent="-342900" algn="l" rtl="0">
-              <a:spcBef>
-                <a:spcPts val="0"/>
-              </a:spcBef>
-              <a:spcAft>
-                <a:spcPts val="0"/>
-              </a:spcAft>
-              <a:buNone/>
-            </a:pPr>
-            <a:r>
-              <a:rPr lang="en-AU" sz="1400" b="1" i="0" u="none" strike="noStrike" cap="none">
-                <a:solidFill>
-                  <a:schemeClr val="lt1"/>
-                </a:solidFill>
-                <a:latin typeface="Arial"/>
-                <a:ea typeface="Arial"/>
-                <a:cs typeface="Arial"/>
-                <a:sym typeface="Arial"/>
-              </a:rPr>
-              <a:t>Sub-issue</a:t>
-            </a:r>
-            <a:endParaRPr/>
+            <a:endParaRPr sz="900" dirty="0"/>
           </a:p>
         </p:txBody>
       </p:sp>
@@ -4002,7 +4142,7 @@
         </p:nvCxnSpPr>
         <p:spPr>
           <a:xfrm rot="10800000" flipH="1">
-            <a:off x="2527423" y="1967663"/>
+            <a:off x="2780140" y="1948902"/>
             <a:ext cx="224700" cy="206100"/>
           </a:xfrm>
           <a:prstGeom prst="bentConnector3">
@@ -4030,7 +4170,7 @@
         </p:nvCxnSpPr>
         <p:spPr>
           <a:xfrm>
-            <a:off x="2527423" y="2173763"/>
+            <a:off x="2781859" y="2155576"/>
             <a:ext cx="224700" cy="206100"/>
           </a:xfrm>
           <a:prstGeom prst="bentConnector3">
@@ -4058,7 +4198,7 @@
         </p:nvCxnSpPr>
         <p:spPr>
           <a:xfrm rot="10800000" flipH="1">
-            <a:off x="2527423" y="2792106"/>
+            <a:off x="2713662" y="2801569"/>
             <a:ext cx="224700" cy="206100"/>
           </a:xfrm>
           <a:prstGeom prst="bentConnector3">
@@ -4086,7 +4226,7 @@
         </p:nvCxnSpPr>
         <p:spPr>
           <a:xfrm>
-            <a:off x="2527423" y="2998206"/>
+            <a:off x="2715087" y="2998208"/>
             <a:ext cx="224700" cy="206100"/>
           </a:xfrm>
           <a:prstGeom prst="bentConnector3">
@@ -4114,7 +4254,7 @@
         </p:nvCxnSpPr>
         <p:spPr>
           <a:xfrm rot="10800000" flipH="1">
-            <a:off x="2527423" y="3616549"/>
+            <a:off x="2736611" y="3616549"/>
             <a:ext cx="224700" cy="206100"/>
           </a:xfrm>
           <a:prstGeom prst="bentConnector3">
@@ -4142,63 +4282,7 @@
         </p:nvCxnSpPr>
         <p:spPr>
           <a:xfrm>
-            <a:off x="2527423" y="3822649"/>
-            <a:ext cx="224700" cy="206100"/>
-          </a:xfrm>
-          <a:prstGeom prst="bentConnector3">
-            <a:avLst>
-              <a:gd name="adj1" fmla="val 49988"/>
-            </a:avLst>
-          </a:prstGeom>
-          <a:noFill/>
-          <a:ln w="19050" cap="flat" cmpd="sng">
-            <a:solidFill>
-              <a:schemeClr val="accent3"/>
-            </a:solidFill>
-            <a:prstDash val="solid"/>
-            <a:miter lim="800000"/>
-            <a:headEnd type="none" w="med" len="med"/>
-            <a:tailEnd type="none" w="med" len="med"/>
-          </a:ln>
-        </p:spPr>
-      </p:cxnSp>
-      <p:cxnSp>
-        <p:nvCxnSpPr>
-          <p:cNvPr id="42" name="Google Shape;42;p1"/>
-          <p:cNvCxnSpPr/>
-          <p:nvPr/>
-        </p:nvCxnSpPr>
-        <p:spPr>
-          <a:xfrm rot="10800000" flipH="1">
-            <a:off x="2527423" y="5265432"/>
-            <a:ext cx="224700" cy="206100"/>
-          </a:xfrm>
-          <a:prstGeom prst="bentConnector3">
-            <a:avLst>
-              <a:gd name="adj1" fmla="val 49988"/>
-            </a:avLst>
-          </a:prstGeom>
-          <a:noFill/>
-          <a:ln w="19050" cap="flat" cmpd="sng">
-            <a:solidFill>
-              <a:schemeClr val="accent3"/>
-            </a:solidFill>
-            <a:prstDash val="solid"/>
-            <a:miter lim="800000"/>
-            <a:headEnd type="none" w="med" len="med"/>
-            <a:tailEnd type="none" w="med" len="med"/>
-          </a:ln>
-        </p:spPr>
-      </p:cxnSp>
-      <p:cxnSp>
-        <p:nvCxnSpPr>
-          <p:cNvPr id="43" name="Google Shape;43;p1"/>
-          <p:cNvCxnSpPr/>
-          <p:nvPr/>
-        </p:nvCxnSpPr>
-        <p:spPr>
-          <a:xfrm>
-            <a:off x="2527423" y="5471532"/>
+            <a:off x="2746083" y="3804459"/>
             <a:ext cx="224700" cy="206100"/>
           </a:xfrm>
           <a:prstGeom prst="bentConnector3">
@@ -4275,41 +4359,15 @@
       <p:cxnSp>
         <p:nvCxnSpPr>
           <p:cNvPr id="46" name="Google Shape;46;p1"/>
-          <p:cNvCxnSpPr/>
+          <p:cNvCxnSpPr>
+            <a:cxnSpLocks/>
+          </p:cNvCxnSpPr>
           <p:nvPr/>
         </p:nvCxnSpPr>
         <p:spPr>
           <a:xfrm rot="-5400000" flipH="1">
             <a:off x="1090260" y="4117849"/>
             <a:ext cx="824400" cy="234000"/>
-          </a:xfrm>
-          <a:prstGeom prst="bentConnector3">
-            <a:avLst>
-              <a:gd name="adj1" fmla="val 0"/>
-            </a:avLst>
-          </a:prstGeom>
-          <a:noFill/>
-          <a:ln w="19050" cap="flat" cmpd="sng">
-            <a:solidFill>
-              <a:schemeClr val="accent3"/>
-            </a:solidFill>
-            <a:prstDash val="solid"/>
-            <a:miter lim="800000"/>
-            <a:headEnd type="none" w="med" len="med"/>
-            <a:tailEnd type="none" w="med" len="med"/>
-          </a:ln>
-        </p:spPr>
-      </p:cxnSp>
-      <p:cxnSp>
-        <p:nvCxnSpPr>
-          <p:cNvPr id="47" name="Google Shape;47;p1"/>
-          <p:cNvCxnSpPr/>
-          <p:nvPr/>
-        </p:nvCxnSpPr>
-        <p:spPr>
-          <a:xfrm rot="-5400000" flipH="1">
-            <a:off x="678060" y="4530049"/>
-            <a:ext cx="1648800" cy="234000"/>
           </a:xfrm>
           <a:prstGeom prst="bentConnector3">
             <a:avLst>
@@ -4371,10 +4429,10 @@
               <a:buNone/>
             </a:pPr>
             <a:r>
-              <a:rPr lang="en-AU" sz="1900"/>
-              <a:t>Issue Tree Template</a:t>
+              <a:rPr lang="en-AU" sz="1900" dirty="0"/>
+              <a:t>Nordic Sensing Issue Tree</a:t>
             </a:r>
-            <a:endParaRPr/>
+            <a:endParaRPr dirty="0"/>
           </a:p>
         </p:txBody>
       </p:sp>
@@ -5374,7 +5432,7 @@
         </p:nvSpPr>
         <p:spPr>
           <a:xfrm>
-            <a:off x="4011786" y="1774598"/>
+            <a:off x="4336332" y="1633030"/>
             <a:ext cx="157086" cy="4223771"/>
           </a:xfrm>
           <a:prstGeom prst="rightBrace">
@@ -5421,32 +5479,76 @@
           </a:p>
         </p:txBody>
       </p:sp>
+      <p:cxnSp>
+        <p:nvCxnSpPr>
+          <p:cNvPr id="68" name="Google Shape;40;p1">
+            <a:extLst>
+              <a:ext uri="{FF2B5EF4-FFF2-40B4-BE49-F238E27FC236}">
+                <a16:creationId xmlns:a16="http://schemas.microsoft.com/office/drawing/2014/main" id="{5C651090-9F93-47B2-A9DB-837973F14E09}"/>
+              </a:ext>
+            </a:extLst>
+          </p:cNvPr>
+          <p:cNvCxnSpPr/>
+          <p:nvPr/>
+        </p:nvCxnSpPr>
+        <p:spPr>
+          <a:xfrm rot="10800000" flipH="1">
+            <a:off x="4404799" y="3553990"/>
+            <a:ext cx="224700" cy="206100"/>
+          </a:xfrm>
+          <a:prstGeom prst="bentConnector3">
+            <a:avLst>
+              <a:gd name="adj1" fmla="val 49988"/>
+            </a:avLst>
+          </a:prstGeom>
+          <a:noFill/>
+          <a:ln w="19050" cap="flat" cmpd="sng">
+            <a:solidFill>
+              <a:schemeClr val="accent3"/>
+            </a:solidFill>
+            <a:prstDash val="solid"/>
+            <a:miter lim="800000"/>
+            <a:headEnd type="none" w="med" len="med"/>
+            <a:tailEnd type="none" w="med" len="med"/>
+          </a:ln>
+        </p:spPr>
+      </p:cxnSp>
       <p:sp>
         <p:nvSpPr>
-          <p:cNvPr id="67" name="Google Shape;67;p1"/>
-          <p:cNvSpPr txBox="1"/>
+          <p:cNvPr id="70" name="Google Shape;30;p1">
+            <a:extLst>
+              <a:ext uri="{FF2B5EF4-FFF2-40B4-BE49-F238E27FC236}">
+                <a16:creationId xmlns:a16="http://schemas.microsoft.com/office/drawing/2014/main" id="{D0592285-C7D5-461A-9AA3-79D23D47A999}"/>
+              </a:ext>
+            </a:extLst>
+          </p:cNvPr>
+          <p:cNvSpPr/>
           <p:nvPr/>
         </p:nvSpPr>
         <p:spPr>
           <a:xfrm>
-            <a:off x="4262958" y="3532540"/>
-            <a:ext cx="2047155" cy="707886"/>
+            <a:off x="4650584" y="3266468"/>
+            <a:ext cx="1361577" cy="413731"/>
           </a:xfrm>
-          <a:prstGeom prst="rect">
-            <a:avLst/>
+          <a:prstGeom prst="round1Rect">
+            <a:avLst>
+              <a:gd name="adj" fmla="val 16667"/>
+            </a:avLst>
           </a:prstGeom>
-          <a:noFill/>
+          <a:solidFill>
+            <a:srgbClr val="00C09D"/>
+          </a:solidFill>
           <a:ln>
             <a:noFill/>
           </a:ln>
         </p:spPr>
         <p:txBody>
-          <a:bodyPr spcFirstLastPara="1" wrap="square" lIns="91425" tIns="45700" rIns="91425" bIns="45700" anchor="t" anchorCtr="0">
-            <a:spAutoFit/>
+          <a:bodyPr spcFirstLastPara="1" wrap="square" lIns="54850" tIns="45700" rIns="45700" bIns="45700" anchor="ctr" anchorCtr="0">
+            <a:noAutofit/>
           </a:bodyPr>
           <a:lstStyle/>
           <a:p>
-            <a:pPr marL="0" marR="0" lvl="0" indent="0" algn="just" rtl="0">
+            <a:pPr marL="342900" marR="0" lvl="0" indent="-342900" algn="l" rtl="0">
               <a:spcBef>
                 <a:spcPts val="0"/>
               </a:spcBef>
@@ -5456,88 +5558,18 @@
               <a:buNone/>
             </a:pPr>
             <a:r>
-              <a:rPr lang="en-AU" sz="1000">
-                <a:solidFill>
-                  <a:schemeClr val="dk1"/>
+              <a:rPr lang="en-US" sz="1000" b="1" i="0" u="none" strike="noStrike" cap="none" dirty="0">
+                <a:solidFill>
+                  <a:schemeClr val="lt1"/>
                 </a:solidFill>
                 <a:latin typeface="Arial"/>
                 <a:ea typeface="Arial"/>
                 <a:cs typeface="Arial"/>
                 <a:sym typeface="Arial"/>
               </a:rPr>
-              <a:t>Each Sub-Issue provides further</a:t>
+              <a:t>Revise Training Methods</a:t>
             </a:r>
-            <a:br>
-              <a:rPr lang="en-AU" sz="1000">
-                <a:solidFill>
-                  <a:schemeClr val="dk1"/>
-                </a:solidFill>
-                <a:latin typeface="Arial"/>
-                <a:ea typeface="Arial"/>
-                <a:cs typeface="Arial"/>
-                <a:sym typeface="Arial"/>
-              </a:rPr>
-            </a:br>
-            <a:r>
-              <a:rPr lang="en-AU" sz="1000">
-                <a:solidFill>
-                  <a:schemeClr val="dk1"/>
-                </a:solidFill>
-                <a:latin typeface="Arial"/>
-                <a:ea typeface="Arial"/>
-                <a:cs typeface="Arial"/>
-                <a:sym typeface="Arial"/>
-              </a:rPr>
-              <a:t>level of detail for each issue,</a:t>
-            </a:r>
-            <a:br>
-              <a:rPr lang="en-AU" sz="1000">
-                <a:solidFill>
-                  <a:schemeClr val="dk1"/>
-                </a:solidFill>
-                <a:latin typeface="Arial"/>
-                <a:ea typeface="Arial"/>
-                <a:cs typeface="Arial"/>
-                <a:sym typeface="Arial"/>
-              </a:rPr>
-            </a:br>
-            <a:r>
-              <a:rPr lang="en-AU" sz="1000">
-                <a:solidFill>
-                  <a:schemeClr val="dk1"/>
-                </a:solidFill>
-                <a:latin typeface="Arial"/>
-                <a:ea typeface="Arial"/>
-                <a:cs typeface="Arial"/>
-                <a:sym typeface="Arial"/>
-              </a:rPr>
-              <a:t>but is complete</a:t>
-            </a:r>
-            <a:endParaRPr/>
-          </a:p>
-          <a:p>
-            <a:pPr marL="0" marR="0" lvl="0" indent="0" algn="just" rtl="0">
-              <a:spcBef>
-                <a:spcPts val="0"/>
-              </a:spcBef>
-              <a:spcAft>
-                <a:spcPts val="0"/>
-              </a:spcAft>
-              <a:buNone/>
-            </a:pPr>
-            <a:r>
-              <a:rPr lang="en-AU" sz="1000">
-                <a:solidFill>
-                  <a:schemeClr val="dk1"/>
-                </a:solidFill>
-                <a:latin typeface="Arial"/>
-                <a:ea typeface="Arial"/>
-                <a:cs typeface="Arial"/>
-                <a:sym typeface="Arial"/>
-              </a:rPr>
-              <a:t>and non-overlapping</a:t>
-            </a:r>
-            <a:endParaRPr/>
+            <a:endParaRPr lang="en-US" sz="1000" dirty="0"/>
           </a:p>
         </p:txBody>
       </p:sp>

</xml_diff>